<commit_message>
add poster files and some image_ipynb
</commit_message>
<xml_diff>
--- a/Task1&3ForwardInformationImgs.pptx
+++ b/Task1&3ForwardInformationImgs.pptx
@@ -5094,7 +5094,34 @@
           <a:bodyPr/>
           <a:lstStyle/>
           <a:p>
-            <a:endParaRPr lang="zh-CN" altLang="en-US"/>
+            <a:r>
+              <a:rPr lang="zh-CN" altLang="en-US" dirty="0"/>
+              <a:t>第一个是</a:t>
+            </a:r>
+            <a:r>
+              <a:rPr lang="en-US" altLang="zh-CN" dirty="0"/>
+              <a:t>neuron</a:t>
+            </a:r>
+            <a:r>
+              <a:rPr lang="zh-CN" altLang="en-US" dirty="0"/>
+              <a:t>和互信息；第二个是对于</a:t>
+            </a:r>
+            <a:r>
+              <a:rPr lang="en-US" altLang="zh-CN" dirty="0"/>
+              <a:t>dynamic/static grating</a:t>
+            </a:r>
+            <a:r>
+              <a:rPr lang="zh-CN" altLang="en-US" dirty="0"/>
+              <a:t>每个刺激分成</a:t>
+            </a:r>
+            <a:r>
+              <a:rPr lang="en-US" altLang="zh-CN" dirty="0"/>
+              <a:t>0-20-40-60-80-100</a:t>
+            </a:r>
+            <a:r>
+              <a:rPr lang="zh-CN" altLang="en-US" dirty="0"/>
+              <a:t>五段，然后分别和原始刺激信号比较互信息量</a:t>
+            </a:r>
           </a:p>
         </p:txBody>
       </p:sp>

</xml_diff>